<commit_message>
fix T1T2 routing diagram
this was only a visual error in the diagram; the code behaves as it should.
</commit_message>
<xml_diff>
--- a/vignettes/Routing_scenario_1.pptx
+++ b/vignettes/Routing_scenario_1.pptx
@@ -200,7 +200,7 @@
           <a:p>
             <a:fld id="{3DE28312-BF62-9C48-BD2C-DB140F85D22E}" type="datetimeFigureOut">
               <a:rPr lang="en-US" smtClean="0"/>
-              <a:t>4/15/21</a:t>
+              <a:t>6/26/2022</a:t>
             </a:fld>
             <a:endParaRPr lang="en-US"/>
           </a:p>
@@ -866,7 +866,7 @@
           <a:p>
             <a:fld id="{ECC6E84B-5DC3-954F-A071-9FB3EE8B7F01}" type="datetimeFigureOut">
               <a:rPr lang="en-US" smtClean="0"/>
-              <a:t>4/15/21</a:t>
+              <a:t>6/26/2022</a:t>
             </a:fld>
             <a:endParaRPr lang="en-US"/>
           </a:p>
@@ -1064,7 +1064,7 @@
           <a:p>
             <a:fld id="{ECC6E84B-5DC3-954F-A071-9FB3EE8B7F01}" type="datetimeFigureOut">
               <a:rPr lang="en-US" smtClean="0"/>
-              <a:t>4/15/21</a:t>
+              <a:t>6/26/2022</a:t>
             </a:fld>
             <a:endParaRPr lang="en-US"/>
           </a:p>
@@ -1272,7 +1272,7 @@
           <a:p>
             <a:fld id="{ECC6E84B-5DC3-954F-A071-9FB3EE8B7F01}" type="datetimeFigureOut">
               <a:rPr lang="en-US" smtClean="0"/>
-              <a:t>4/15/21</a:t>
+              <a:t>6/26/2022</a:t>
             </a:fld>
             <a:endParaRPr lang="en-US"/>
           </a:p>
@@ -1470,7 +1470,7 @@
           <a:p>
             <a:fld id="{ECC6E84B-5DC3-954F-A071-9FB3EE8B7F01}" type="datetimeFigureOut">
               <a:rPr lang="en-US" smtClean="0"/>
-              <a:t>4/15/21</a:t>
+              <a:t>6/26/2022</a:t>
             </a:fld>
             <a:endParaRPr lang="en-US"/>
           </a:p>
@@ -1745,7 +1745,7 @@
           <a:p>
             <a:fld id="{ECC6E84B-5DC3-954F-A071-9FB3EE8B7F01}" type="datetimeFigureOut">
               <a:rPr lang="en-US" smtClean="0"/>
-              <a:t>4/15/21</a:t>
+              <a:t>6/26/2022</a:t>
             </a:fld>
             <a:endParaRPr lang="en-US"/>
           </a:p>
@@ -2010,7 +2010,7 @@
           <a:p>
             <a:fld id="{ECC6E84B-5DC3-954F-A071-9FB3EE8B7F01}" type="datetimeFigureOut">
               <a:rPr lang="en-US" smtClean="0"/>
-              <a:t>4/15/21</a:t>
+              <a:t>6/26/2022</a:t>
             </a:fld>
             <a:endParaRPr lang="en-US"/>
           </a:p>
@@ -2422,7 +2422,7 @@
           <a:p>
             <a:fld id="{ECC6E84B-5DC3-954F-A071-9FB3EE8B7F01}" type="datetimeFigureOut">
               <a:rPr lang="en-US" smtClean="0"/>
-              <a:t>4/15/21</a:t>
+              <a:t>6/26/2022</a:t>
             </a:fld>
             <a:endParaRPr lang="en-US"/>
           </a:p>
@@ -2563,7 +2563,7 @@
           <a:p>
             <a:fld id="{ECC6E84B-5DC3-954F-A071-9FB3EE8B7F01}" type="datetimeFigureOut">
               <a:rPr lang="en-US" smtClean="0"/>
-              <a:t>4/15/21</a:t>
+              <a:t>6/26/2022</a:t>
             </a:fld>
             <a:endParaRPr lang="en-US"/>
           </a:p>
@@ -2676,7 +2676,7 @@
           <a:p>
             <a:fld id="{ECC6E84B-5DC3-954F-A071-9FB3EE8B7F01}" type="datetimeFigureOut">
               <a:rPr lang="en-US" smtClean="0"/>
-              <a:t>4/15/21</a:t>
+              <a:t>6/26/2022</a:t>
             </a:fld>
             <a:endParaRPr lang="en-US"/>
           </a:p>
@@ -2987,7 +2987,7 @@
           <a:p>
             <a:fld id="{ECC6E84B-5DC3-954F-A071-9FB3EE8B7F01}" type="datetimeFigureOut">
               <a:rPr lang="en-US" smtClean="0"/>
-              <a:t>4/15/21</a:t>
+              <a:t>6/26/2022</a:t>
             </a:fld>
             <a:endParaRPr lang="en-US"/>
           </a:p>
@@ -3275,7 +3275,7 @@
           <a:p>
             <a:fld id="{ECC6E84B-5DC3-954F-A071-9FB3EE8B7F01}" type="datetimeFigureOut">
               <a:rPr lang="en-US" smtClean="0"/>
-              <a:t>4/15/21</a:t>
+              <a:t>6/26/2022</a:t>
             </a:fld>
             <a:endParaRPr lang="en-US"/>
           </a:p>
@@ -3516,7 +3516,7 @@
           <a:p>
             <a:fld id="{ECC6E84B-5DC3-954F-A071-9FB3EE8B7F01}" type="datetimeFigureOut">
               <a:rPr lang="en-US" smtClean="0"/>
-              <a:t>4/15/21</a:t>
+              <a:t>6/26/2022</a:t>
             </a:fld>
             <a:endParaRPr lang="en-US"/>
           </a:p>
@@ -5855,14 +5855,14 @@
             <p:cNvCxnSpPr>
               <a:cxnSpLocks/>
               <a:stCxn id="166" idx="3"/>
-              <a:endCxn id="74" idx="1"/>
+              <a:endCxn id="72" idx="1"/>
             </p:cNvCxnSpPr>
             <p:nvPr/>
           </p:nvCxnSpPr>
           <p:spPr>
-            <a:xfrm>
-              <a:off x="7378357" y="4064507"/>
-              <a:ext cx="1144109" cy="380276"/>
+            <a:xfrm flipV="1">
+              <a:off x="7378357" y="3171611"/>
+              <a:ext cx="1144109" cy="892896"/>
             </a:xfrm>
             <a:prstGeom prst="straightConnector1">
               <a:avLst/>

</xml_diff>